<commit_message>
update author lit on cheatsheet
</commit_message>
<xml_diff>
--- a/py-pkgs/content/img/09-cheatsheet/py_pkgs_cheatsheet.pptx
+++ b/py-pkgs/content/img/09-cheatsheet/py_pkgs_cheatsheet.pptx
@@ -2206,7 +2206,7 @@
           </a:ln>
           <a:extLst>
             <a:ext uri="{C572A759-6A51-4108-AA02-DFA0A04FC94B}">
-              <ma14:wrappingTextBoxFlag xmlns:ma14="http://schemas.microsoft.com/office/mac/drawingml/2011/main" xmlns:a14="http://schemas.microsoft.com/office/drawing/2010/main" xmlns:m="http://schemas.openxmlformats.org/officeDocument/2006/math" xmlns="" val="1"/>
+              <ma14:wrappingTextBoxFlag xmlns="" xmlns:m="http://schemas.openxmlformats.org/officeDocument/2006/math" xmlns:a14="http://schemas.microsoft.com/office/drawing/2010/main" xmlns:ma14="http://schemas.microsoft.com/office/mac/drawingml/2011/main" val="1"/>
             </a:ext>
           </a:extLst>
         </p:spPr>
@@ -2245,7 +2245,7 @@
           </a:ln>
           <a:extLst>
             <a:ext uri="{C572A759-6A51-4108-AA02-DFA0A04FC94B}">
-              <ma14:wrappingTextBoxFlag xmlns:ma14="http://schemas.microsoft.com/office/mac/drawingml/2011/main" xmlns:a14="http://schemas.microsoft.com/office/drawing/2010/main" xmlns:m="http://schemas.openxmlformats.org/officeDocument/2006/math" xmlns="" val="1"/>
+              <ma14:wrappingTextBoxFlag xmlns="" xmlns:m="http://schemas.openxmlformats.org/officeDocument/2006/math" xmlns:a14="http://schemas.microsoft.com/office/drawing/2010/main" xmlns:ma14="http://schemas.microsoft.com/office/mac/drawingml/2011/main" val="1"/>
             </a:ext>
           </a:extLst>
         </p:spPr>
@@ -3370,7 +3370,7 @@
           </a:ln>
           <a:extLst>
             <a:ext uri="{C572A759-6A51-4108-AA02-DFA0A04FC94B}">
-              <ma14:wrappingTextBoxFlag xmlns:ma14="http://schemas.microsoft.com/office/mac/drawingml/2011/main" xmlns:a14="http://schemas.microsoft.com/office/drawing/2010/main" xmlns:m="http://schemas.openxmlformats.org/officeDocument/2006/math" xmlns="" val="1"/>
+              <ma14:wrappingTextBoxFlag xmlns="" xmlns:m="http://schemas.openxmlformats.org/officeDocument/2006/math" xmlns:a14="http://schemas.microsoft.com/office/drawing/2010/main" xmlns:ma14="http://schemas.microsoft.com/office/mac/drawingml/2011/main" val="1"/>
             </a:ext>
           </a:extLst>
         </p:spPr>
@@ -3810,7 +3810,7 @@
           </a:ln>
           <a:extLst>
             <a:ext uri="{C572A759-6A51-4108-AA02-DFA0A04FC94B}">
-              <ma14:wrappingTextBoxFlag xmlns:ma14="http://schemas.microsoft.com/office/mac/drawingml/2011/main" xmlns:a14="http://schemas.microsoft.com/office/drawing/2010/main" xmlns:m="http://schemas.openxmlformats.org/officeDocument/2006/math" xmlns="" val="1"/>
+              <ma14:wrappingTextBoxFlag xmlns="" xmlns:m="http://schemas.openxmlformats.org/officeDocument/2006/math" xmlns:a14="http://schemas.microsoft.com/office/drawing/2010/main" xmlns:ma14="http://schemas.microsoft.com/office/mac/drawingml/2011/main" val="1"/>
             </a:ext>
           </a:extLst>
         </p:spPr>
@@ -3868,6 +3868,16 @@
                 <a:hlinkClick r:id="rId5"/>
               </a:rPr>
               <a:t>https://www.tomasbeuzen.com/</a:t>
+            </a:r>
+            <a:r>
+              <a:rPr lang="en-CA" sz="900" b="0" dirty="0"/>
+              <a:t>) &amp; Tiffany Timbers (</a:t>
+            </a:r>
+            <a:r>
+              <a:rPr lang="en-CA" sz="900" b="0" dirty="0">
+                <a:hlinkClick r:id="rId6"/>
+              </a:rPr>
+              <a:t>https://www.tiffanytimbers.com/</a:t>
             </a:r>
             <a:r>
               <a:rPr lang="en-CA" sz="900" b="0" dirty="0"/>
@@ -3922,7 +3932,7 @@
           <p:nvPr/>
         </p:nvPicPr>
         <p:blipFill>
-          <a:blip r:embed="rId6">
+          <a:blip r:embed="rId7">
             <a:extLst>
               <a:ext uri="{28A0092B-C50C-407E-A947-70E740481C1C}">
                 <a14:useLocalDpi xmlns:a14="http://schemas.microsoft.com/office/drawing/2010/main" val="0"/>
@@ -4061,7 +4071,7 @@
           </a:ln>
           <a:extLst>
             <a:ext uri="{C572A759-6A51-4108-AA02-DFA0A04FC94B}">
-              <ma14:wrappingTextBoxFlag xmlns:ma14="http://schemas.microsoft.com/office/mac/drawingml/2011/main" xmlns:a14="http://schemas.microsoft.com/office/drawing/2010/main" xmlns:m="http://schemas.openxmlformats.org/officeDocument/2006/math" xmlns="" val="1"/>
+              <ma14:wrappingTextBoxFlag xmlns="" xmlns:m="http://schemas.openxmlformats.org/officeDocument/2006/math" xmlns:a14="http://schemas.microsoft.com/office/drawing/2010/main" xmlns:ma14="http://schemas.microsoft.com/office/mac/drawingml/2011/main" val="1"/>
             </a:ext>
           </a:extLst>
         </p:spPr>
@@ -4228,7 +4238,7 @@
             </a:ln>
             <a:extLst>
               <a:ext uri="{C572A759-6A51-4108-AA02-DFA0A04FC94B}">
-                <ma14:wrappingTextBoxFlag xmlns:ma14="http://schemas.microsoft.com/office/mac/drawingml/2011/main" xmlns:a14="http://schemas.microsoft.com/office/drawing/2010/main" xmlns:m="http://schemas.openxmlformats.org/officeDocument/2006/math" xmlns="" val="1"/>
+                <ma14:wrappingTextBoxFlag xmlns="" xmlns:m="http://schemas.openxmlformats.org/officeDocument/2006/math" xmlns:a14="http://schemas.microsoft.com/office/drawing/2010/main" xmlns:ma14="http://schemas.microsoft.com/office/mac/drawingml/2011/main" val="1"/>
               </a:ext>
             </a:extLst>
           </p:spPr>
@@ -4322,7 +4332,7 @@
           </a:ln>
           <a:extLst>
             <a:ext uri="{C572A759-6A51-4108-AA02-DFA0A04FC94B}">
-              <ma14:wrappingTextBoxFlag xmlns:ma14="http://schemas.microsoft.com/office/mac/drawingml/2011/main" xmlns:a14="http://schemas.microsoft.com/office/drawing/2010/main" xmlns:m="http://schemas.openxmlformats.org/officeDocument/2006/math" xmlns="" val="1"/>
+              <ma14:wrappingTextBoxFlag xmlns="" xmlns:m="http://schemas.openxmlformats.org/officeDocument/2006/math" xmlns:a14="http://schemas.microsoft.com/office/drawing/2010/main" xmlns:ma14="http://schemas.microsoft.com/office/mac/drawingml/2011/main" val="1"/>
             </a:ext>
           </a:extLst>
         </p:spPr>
@@ -4614,7 +4624,7 @@
           </a:ln>
           <a:extLst>
             <a:ext uri="{C572A759-6A51-4108-AA02-DFA0A04FC94B}">
-              <ma14:wrappingTextBoxFlag xmlns:ma14="http://schemas.microsoft.com/office/mac/drawingml/2011/main" xmlns:a14="http://schemas.microsoft.com/office/drawing/2010/main" xmlns:m="http://schemas.openxmlformats.org/officeDocument/2006/math" xmlns="" val="1"/>
+              <ma14:wrappingTextBoxFlag xmlns="" xmlns:m="http://schemas.openxmlformats.org/officeDocument/2006/math" xmlns:a14="http://schemas.microsoft.com/office/drawing/2010/main" xmlns:ma14="http://schemas.microsoft.com/office/mac/drawingml/2011/main" val="1"/>
             </a:ext>
           </a:extLst>
         </p:spPr>
@@ -4894,7 +4904,7 @@
                           <a:ea typeface="Source Sans Pro Semibold"/>
                           <a:cs typeface="Source Sans Pro Semibold"/>
                           <a:sym typeface="Source Sans Pro Semibold"/>
-                          <a:hlinkClick r:id="rId7"/>
+                          <a:hlinkClick r:id="rId8"/>
                         </a:rPr>
                         <a:t>poetry</a:t>
                       </a:r>
@@ -5042,7 +5052,7 @@
                           <a:ea typeface="Source Sans Pro Semibold"/>
                           <a:cs typeface="Source Sans Pro Semibold"/>
                           <a:sym typeface="Source Sans Pro Semibold"/>
-                          <a:hlinkClick r:id="rId8"/>
+                          <a:hlinkClick r:id="rId9"/>
                         </a:rPr>
                         <a:t>GitHub</a:t>
                       </a:r>
@@ -5194,7 +5204,7 @@
                           <a:ea typeface="Source Sans Pro Semibold"/>
                           <a:cs typeface="Source Sans Pro Semibold"/>
                           <a:sym typeface="Source Sans Pro Semibold"/>
-                          <a:hlinkClick r:id="rId9"/>
+                          <a:hlinkClick r:id="rId10"/>
                         </a:rPr>
                         <a:t>cookiecutter</a:t>
                       </a:r>
@@ -5358,7 +5368,7 @@
           </a:ln>
           <a:extLst>
             <a:ext uri="{C572A759-6A51-4108-AA02-DFA0A04FC94B}">
-              <ma14:wrappingTextBoxFlag xmlns:ma14="http://schemas.microsoft.com/office/mac/drawingml/2011/main" xmlns:a14="http://schemas.microsoft.com/office/drawing/2010/main" xmlns:m="http://schemas.openxmlformats.org/officeDocument/2006/math" xmlns="" val="1"/>
+              <ma14:wrappingTextBoxFlag xmlns="" xmlns:m="http://schemas.openxmlformats.org/officeDocument/2006/math" xmlns:a14="http://schemas.microsoft.com/office/drawing/2010/main" xmlns:ma14="http://schemas.microsoft.com/office/mac/drawingml/2011/main" val="1"/>
             </a:ext>
           </a:extLst>
         </p:spPr>
@@ -5444,7 +5454,7 @@
           </a:ln>
           <a:extLst>
             <a:ext uri="{C572A759-6A51-4108-AA02-DFA0A04FC94B}">
-              <ma14:wrappingTextBoxFlag xmlns:ma14="http://schemas.microsoft.com/office/mac/drawingml/2011/main" xmlns:a14="http://schemas.microsoft.com/office/drawing/2010/main" xmlns:m="http://schemas.openxmlformats.org/officeDocument/2006/math" xmlns="" val="1"/>
+              <ma14:wrappingTextBoxFlag xmlns="" xmlns:m="http://schemas.openxmlformats.org/officeDocument/2006/math" xmlns:a14="http://schemas.microsoft.com/office/drawing/2010/main" xmlns:ma14="http://schemas.microsoft.com/office/mac/drawingml/2011/main" val="1"/>
             </a:ext>
           </a:extLst>
         </p:spPr>
@@ -5477,7 +5487,7 @@
             </a:r>
             <a:r>
               <a:rPr lang="en-US" dirty="0">
-                <a:hlinkClick r:id="rId10"/>
+                <a:hlinkClick r:id="rId11"/>
               </a:rPr>
               <a:t>CLI package</a:t>
             </a:r>
@@ -5536,7 +5546,7 @@
           </a:ln>
           <a:extLst>
             <a:ext uri="{C572A759-6A51-4108-AA02-DFA0A04FC94B}">
-              <ma14:wrappingTextBoxFlag xmlns:ma14="http://schemas.microsoft.com/office/mac/drawingml/2011/main" xmlns:a14="http://schemas.microsoft.com/office/drawing/2010/main" xmlns:m="http://schemas.openxmlformats.org/officeDocument/2006/math" xmlns="" val="1"/>
+              <ma14:wrappingTextBoxFlag xmlns="" xmlns:m="http://schemas.openxmlformats.org/officeDocument/2006/math" xmlns:a14="http://schemas.microsoft.com/office/drawing/2010/main" xmlns:ma14="http://schemas.microsoft.com/office/mac/drawingml/2011/main" val="1"/>
             </a:ext>
           </a:extLst>
         </p:spPr>
@@ -5603,7 +5613,7 @@
           </a:ln>
           <a:extLst>
             <a:ext uri="{C572A759-6A51-4108-AA02-DFA0A04FC94B}">
-              <ma14:wrappingTextBoxFlag xmlns:ma14="http://schemas.microsoft.com/office/mac/drawingml/2011/main" xmlns:a14="http://schemas.microsoft.com/office/drawing/2010/main" xmlns:m="http://schemas.openxmlformats.org/officeDocument/2006/math" xmlns="" val="1"/>
+              <ma14:wrappingTextBoxFlag xmlns="" xmlns:m="http://schemas.openxmlformats.org/officeDocument/2006/math" xmlns:a14="http://schemas.microsoft.com/office/drawing/2010/main" xmlns:ma14="http://schemas.microsoft.com/office/mac/drawingml/2011/main" val="1"/>
             </a:ext>
           </a:extLst>
         </p:spPr>
@@ -5719,7 +5729,7 @@
           </a:ln>
           <a:extLst>
             <a:ext uri="{C572A759-6A51-4108-AA02-DFA0A04FC94B}">
-              <ma14:wrappingTextBoxFlag xmlns:ma14="http://schemas.microsoft.com/office/mac/drawingml/2011/main" xmlns:a14="http://schemas.microsoft.com/office/drawing/2010/main" xmlns:m="http://schemas.openxmlformats.org/officeDocument/2006/math" xmlns="" val="1"/>
+              <ma14:wrappingTextBoxFlag xmlns="" xmlns:m="http://schemas.openxmlformats.org/officeDocument/2006/math" xmlns:a14="http://schemas.microsoft.com/office/drawing/2010/main" xmlns:ma14="http://schemas.microsoft.com/office/mac/drawingml/2011/main" val="1"/>
             </a:ext>
           </a:extLst>
         </p:spPr>
@@ -5789,7 +5799,7 @@
           </a:ln>
           <a:extLst>
             <a:ext uri="{C572A759-6A51-4108-AA02-DFA0A04FC94B}">
-              <ma14:wrappingTextBoxFlag xmlns:ma14="http://schemas.microsoft.com/office/mac/drawingml/2011/main" xmlns:a14="http://schemas.microsoft.com/office/drawing/2010/main" xmlns:m="http://schemas.openxmlformats.org/officeDocument/2006/math" xmlns="" val="1"/>
+              <ma14:wrappingTextBoxFlag xmlns="" xmlns:m="http://schemas.openxmlformats.org/officeDocument/2006/math" xmlns:a14="http://schemas.microsoft.com/office/drawing/2010/main" xmlns:ma14="http://schemas.microsoft.com/office/mac/drawingml/2011/main" val="1"/>
             </a:ext>
           </a:extLst>
         </p:spPr>
@@ -5844,7 +5854,7 @@
                 <a:ea typeface="Source Sans Pro"/>
                 <a:cs typeface="Source Sans Pro"/>
                 <a:sym typeface="Source Sans Pro"/>
-                <a:hlinkClick r:id="rId11"/>
+                <a:hlinkClick r:id="rId12"/>
               </a:rPr>
               <a:t>UBC-MDS </a:t>
             </a:r>
@@ -5857,7 +5867,7 @@
                 <a:ea typeface="Source Sans Pro"/>
                 <a:cs typeface="Source Sans Pro"/>
                 <a:sym typeface="Source Sans Pro"/>
-                <a:hlinkClick r:id="rId11"/>
+                <a:hlinkClick r:id="rId12"/>
               </a:rPr>
               <a:t>cookiecutter</a:t>
             </a:r>
@@ -5919,7 +5929,7 @@
           </a:ln>
           <a:extLst>
             <a:ext uri="{C572A759-6A51-4108-AA02-DFA0A04FC94B}">
-              <ma14:wrappingTextBoxFlag xmlns:ma14="http://schemas.microsoft.com/office/mac/drawingml/2011/main" xmlns:a14="http://schemas.microsoft.com/office/drawing/2010/main" xmlns:m="http://schemas.openxmlformats.org/officeDocument/2006/math" xmlns="" val="1"/>
+              <ma14:wrappingTextBoxFlag xmlns="" xmlns:m="http://schemas.openxmlformats.org/officeDocument/2006/math" xmlns:a14="http://schemas.microsoft.com/office/drawing/2010/main" xmlns:ma14="http://schemas.microsoft.com/office/mac/drawingml/2011/main" val="1"/>
             </a:ext>
           </a:extLst>
         </p:spPr>
@@ -5986,7 +5996,7 @@
           </a:ln>
           <a:extLst>
             <a:ext uri="{C572A759-6A51-4108-AA02-DFA0A04FC94B}">
-              <ma14:wrappingTextBoxFlag xmlns:ma14="http://schemas.microsoft.com/office/mac/drawingml/2011/main" xmlns:a14="http://schemas.microsoft.com/office/drawing/2010/main" xmlns:m="http://schemas.openxmlformats.org/officeDocument/2006/math" xmlns="" val="1"/>
+              <ma14:wrappingTextBoxFlag xmlns="" xmlns:m="http://schemas.openxmlformats.org/officeDocument/2006/math" xmlns:a14="http://schemas.microsoft.com/office/drawing/2010/main" xmlns:ma14="http://schemas.microsoft.com/office/mac/drawingml/2011/main" val="1"/>
             </a:ext>
           </a:extLst>
         </p:spPr>
@@ -6105,7 +6115,7 @@
           </a:ln>
           <a:extLst>
             <a:ext uri="{C572A759-6A51-4108-AA02-DFA0A04FC94B}">
-              <ma14:wrappingTextBoxFlag xmlns:ma14="http://schemas.microsoft.com/office/mac/drawingml/2011/main" xmlns:a14="http://schemas.microsoft.com/office/drawing/2010/main" xmlns:m="http://schemas.openxmlformats.org/officeDocument/2006/math" xmlns="" val="1"/>
+              <ma14:wrappingTextBoxFlag xmlns="" xmlns:m="http://schemas.openxmlformats.org/officeDocument/2006/math" xmlns:a14="http://schemas.microsoft.com/office/drawing/2010/main" xmlns:ma14="http://schemas.microsoft.com/office/mac/drawingml/2011/main" val="1"/>
             </a:ext>
           </a:extLst>
         </p:spPr>
@@ -6172,7 +6182,7 @@
           </a:ln>
           <a:extLst>
             <a:ext uri="{C572A759-6A51-4108-AA02-DFA0A04FC94B}">
-              <ma14:wrappingTextBoxFlag xmlns:ma14="http://schemas.microsoft.com/office/mac/drawingml/2011/main" xmlns:a14="http://schemas.microsoft.com/office/drawing/2010/main" xmlns:m="http://schemas.openxmlformats.org/officeDocument/2006/math" xmlns="" val="1"/>
+              <ma14:wrappingTextBoxFlag xmlns="" xmlns:m="http://schemas.openxmlformats.org/officeDocument/2006/math" xmlns:a14="http://schemas.microsoft.com/office/drawing/2010/main" xmlns:ma14="http://schemas.microsoft.com/office/mac/drawingml/2011/main" val="1"/>
             </a:ext>
           </a:extLst>
         </p:spPr>
@@ -6376,7 +6386,7 @@
           </a:ln>
           <a:extLst>
             <a:ext uri="{C572A759-6A51-4108-AA02-DFA0A04FC94B}">
-              <ma14:wrappingTextBoxFlag xmlns:ma14="http://schemas.microsoft.com/office/mac/drawingml/2011/main" xmlns:a14="http://schemas.microsoft.com/office/drawing/2010/main" xmlns:m="http://schemas.openxmlformats.org/officeDocument/2006/math" xmlns="" val="1"/>
+              <ma14:wrappingTextBoxFlag xmlns="" xmlns:m="http://schemas.openxmlformats.org/officeDocument/2006/math" xmlns:a14="http://schemas.microsoft.com/office/drawing/2010/main" xmlns:ma14="http://schemas.microsoft.com/office/mac/drawingml/2011/main" val="1"/>
             </a:ext>
           </a:extLst>
         </p:spPr>
@@ -6529,7 +6539,7 @@
           </a:ln>
           <a:extLst>
             <a:ext uri="{C572A759-6A51-4108-AA02-DFA0A04FC94B}">
-              <ma14:wrappingTextBoxFlag xmlns:ma14="http://schemas.microsoft.com/office/mac/drawingml/2011/main" xmlns:a14="http://schemas.microsoft.com/office/drawing/2010/main" xmlns:m="http://schemas.openxmlformats.org/officeDocument/2006/math" xmlns="" val="1"/>
+              <ma14:wrappingTextBoxFlag xmlns="" xmlns:m="http://schemas.openxmlformats.org/officeDocument/2006/math" xmlns:a14="http://schemas.microsoft.com/office/drawing/2010/main" xmlns:ma14="http://schemas.microsoft.com/office/mac/drawingml/2011/main" val="1"/>
             </a:ext>
           </a:extLst>
         </p:spPr>
@@ -6591,7 +6601,7 @@
           </a:ln>
           <a:extLst>
             <a:ext uri="{C572A759-6A51-4108-AA02-DFA0A04FC94B}">
-              <ma14:wrappingTextBoxFlag xmlns:ma14="http://schemas.microsoft.com/office/mac/drawingml/2011/main" xmlns:a14="http://schemas.microsoft.com/office/drawing/2010/main" xmlns:m="http://schemas.openxmlformats.org/officeDocument/2006/math" xmlns="" val="1"/>
+              <ma14:wrappingTextBoxFlag xmlns="" xmlns:m="http://schemas.openxmlformats.org/officeDocument/2006/math" xmlns:a14="http://schemas.microsoft.com/office/drawing/2010/main" xmlns:ma14="http://schemas.microsoft.com/office/mac/drawingml/2011/main" val="1"/>
             </a:ext>
           </a:extLst>
         </p:spPr>
@@ -6769,7 +6779,7 @@
           </a:ln>
           <a:extLst>
             <a:ext uri="{C572A759-6A51-4108-AA02-DFA0A04FC94B}">
-              <ma14:wrappingTextBoxFlag xmlns:ma14="http://schemas.microsoft.com/office/mac/drawingml/2011/main" xmlns:a14="http://schemas.microsoft.com/office/drawing/2010/main" xmlns:m="http://schemas.openxmlformats.org/officeDocument/2006/math" xmlns="" val="1"/>
+              <ma14:wrappingTextBoxFlag xmlns="" xmlns:m="http://schemas.openxmlformats.org/officeDocument/2006/math" xmlns:a14="http://schemas.microsoft.com/office/drawing/2010/main" xmlns:ma14="http://schemas.microsoft.com/office/mac/drawingml/2011/main" val="1"/>
             </a:ext>
           </a:extLst>
         </p:spPr>
@@ -6922,7 +6932,7 @@
           </a:ln>
           <a:extLst>
             <a:ext uri="{C572A759-6A51-4108-AA02-DFA0A04FC94B}">
-              <ma14:wrappingTextBoxFlag xmlns:ma14="http://schemas.microsoft.com/office/mac/drawingml/2011/main" xmlns:a14="http://schemas.microsoft.com/office/drawing/2010/main" xmlns:m="http://schemas.openxmlformats.org/officeDocument/2006/math" xmlns="" val="1"/>
+              <ma14:wrappingTextBoxFlag xmlns="" xmlns:m="http://schemas.openxmlformats.org/officeDocument/2006/math" xmlns:a14="http://schemas.microsoft.com/office/drawing/2010/main" xmlns:ma14="http://schemas.microsoft.com/office/mac/drawingml/2011/main" val="1"/>
             </a:ext>
           </a:extLst>
         </p:spPr>
@@ -7075,7 +7085,7 @@
           </a:ln>
           <a:extLst>
             <a:ext uri="{C572A759-6A51-4108-AA02-DFA0A04FC94B}">
-              <ma14:wrappingTextBoxFlag xmlns:ma14="http://schemas.microsoft.com/office/mac/drawingml/2011/main" xmlns:a14="http://schemas.microsoft.com/office/drawing/2010/main" xmlns:m="http://schemas.openxmlformats.org/officeDocument/2006/math" xmlns="" val="1"/>
+              <ma14:wrappingTextBoxFlag xmlns="" xmlns:m="http://schemas.openxmlformats.org/officeDocument/2006/math" xmlns:a14="http://schemas.microsoft.com/office/drawing/2010/main" xmlns:ma14="http://schemas.microsoft.com/office/mac/drawingml/2011/main" val="1"/>
             </a:ext>
           </a:extLst>
         </p:spPr>
@@ -7228,7 +7238,7 @@
           </a:ln>
           <a:extLst>
             <a:ext uri="{C572A759-6A51-4108-AA02-DFA0A04FC94B}">
-              <ma14:wrappingTextBoxFlag xmlns:ma14="http://schemas.microsoft.com/office/mac/drawingml/2011/main" xmlns:a14="http://schemas.microsoft.com/office/drawing/2010/main" xmlns:m="http://schemas.openxmlformats.org/officeDocument/2006/math" xmlns="" val="1"/>
+              <ma14:wrappingTextBoxFlag xmlns="" xmlns:m="http://schemas.openxmlformats.org/officeDocument/2006/math" xmlns:a14="http://schemas.microsoft.com/office/drawing/2010/main" xmlns:ma14="http://schemas.microsoft.com/office/mac/drawingml/2011/main" val="1"/>
             </a:ext>
           </a:extLst>
         </p:spPr>
@@ -7290,7 +7300,7 @@
           </a:ln>
           <a:extLst>
             <a:ext uri="{C572A759-6A51-4108-AA02-DFA0A04FC94B}">
-              <ma14:wrappingTextBoxFlag xmlns:ma14="http://schemas.microsoft.com/office/mac/drawingml/2011/main" xmlns:a14="http://schemas.microsoft.com/office/drawing/2010/main" xmlns:m="http://schemas.openxmlformats.org/officeDocument/2006/math" xmlns="" val="1"/>
+              <ma14:wrappingTextBoxFlag xmlns="" xmlns:m="http://schemas.openxmlformats.org/officeDocument/2006/math" xmlns:a14="http://schemas.microsoft.com/office/drawing/2010/main" xmlns:ma14="http://schemas.microsoft.com/office/mac/drawingml/2011/main" val="1"/>
             </a:ext>
           </a:extLst>
         </p:spPr>
@@ -7350,7 +7360,7 @@
           </a:ln>
           <a:extLst>
             <a:ext uri="{C572A759-6A51-4108-AA02-DFA0A04FC94B}">
-              <ma14:wrappingTextBoxFlag xmlns:ma14="http://schemas.microsoft.com/office/mac/drawingml/2011/main" xmlns:a14="http://schemas.microsoft.com/office/drawing/2010/main" xmlns:m="http://schemas.openxmlformats.org/officeDocument/2006/math" xmlns="" val="1"/>
+              <ma14:wrappingTextBoxFlag xmlns="" xmlns:m="http://schemas.openxmlformats.org/officeDocument/2006/math" xmlns:a14="http://schemas.microsoft.com/office/drawing/2010/main" xmlns:ma14="http://schemas.microsoft.com/office/mac/drawingml/2011/main" val="1"/>
             </a:ext>
           </a:extLst>
         </p:spPr>
@@ -7436,7 +7446,7 @@
           </a:ln>
           <a:extLst>
             <a:ext uri="{C572A759-6A51-4108-AA02-DFA0A04FC94B}">
-              <ma14:wrappingTextBoxFlag xmlns:ma14="http://schemas.microsoft.com/office/mac/drawingml/2011/main" xmlns:a14="http://schemas.microsoft.com/office/drawing/2010/main" xmlns:m="http://schemas.openxmlformats.org/officeDocument/2006/math" xmlns="" val="1"/>
+              <ma14:wrappingTextBoxFlag xmlns="" xmlns:m="http://schemas.openxmlformats.org/officeDocument/2006/math" xmlns:a14="http://schemas.microsoft.com/office/drawing/2010/main" xmlns:ma14="http://schemas.microsoft.com/office/mac/drawingml/2011/main" val="1"/>
             </a:ext>
           </a:extLst>
         </p:spPr>
@@ -7503,7 +7513,7 @@
           </a:ln>
           <a:extLst>
             <a:ext uri="{C572A759-6A51-4108-AA02-DFA0A04FC94B}">
-              <ma14:wrappingTextBoxFlag xmlns:ma14="http://schemas.microsoft.com/office/mac/drawingml/2011/main" xmlns:a14="http://schemas.microsoft.com/office/drawing/2010/main" xmlns:m="http://schemas.openxmlformats.org/officeDocument/2006/math" xmlns="" val="1"/>
+              <ma14:wrappingTextBoxFlag xmlns="" xmlns:m="http://schemas.openxmlformats.org/officeDocument/2006/math" xmlns:a14="http://schemas.microsoft.com/office/drawing/2010/main" xmlns:ma14="http://schemas.microsoft.com/office/mac/drawingml/2011/main" val="1"/>
             </a:ext>
           </a:extLst>
         </p:spPr>
@@ -7622,7 +7632,7 @@
           </a:ln>
           <a:extLst>
             <a:ext uri="{C572A759-6A51-4108-AA02-DFA0A04FC94B}">
-              <ma14:wrappingTextBoxFlag xmlns:ma14="http://schemas.microsoft.com/office/mac/drawingml/2011/main" xmlns:a14="http://schemas.microsoft.com/office/drawing/2010/main" xmlns:m="http://schemas.openxmlformats.org/officeDocument/2006/math" xmlns="" val="1"/>
+              <ma14:wrappingTextBoxFlag xmlns="" xmlns:m="http://schemas.openxmlformats.org/officeDocument/2006/math" xmlns:a14="http://schemas.microsoft.com/office/drawing/2010/main" xmlns:ma14="http://schemas.microsoft.com/office/mac/drawingml/2011/main" val="1"/>
             </a:ext>
           </a:extLst>
         </p:spPr>
@@ -7880,7 +7890,7 @@
           </a:ln>
           <a:extLst>
             <a:ext uri="{C572A759-6A51-4108-AA02-DFA0A04FC94B}">
-              <ma14:wrappingTextBoxFlag xmlns:ma14="http://schemas.microsoft.com/office/mac/drawingml/2011/main" xmlns:a14="http://schemas.microsoft.com/office/drawing/2010/main" xmlns:m="http://schemas.openxmlformats.org/officeDocument/2006/math" xmlns="" val="1"/>
+              <ma14:wrappingTextBoxFlag xmlns="" xmlns:m="http://schemas.openxmlformats.org/officeDocument/2006/math" xmlns:a14="http://schemas.microsoft.com/office/drawing/2010/main" xmlns:ma14="http://schemas.microsoft.com/office/mac/drawingml/2011/main" val="1"/>
             </a:ext>
           </a:extLst>
         </p:spPr>
@@ -7974,7 +7984,7 @@
                 <a:ea typeface="Source Sans Pro"/>
                 <a:cs typeface="Source Sans Pro"/>
                 <a:sym typeface="Source Sans Pro"/>
-                <a:hlinkClick r:id="rId12"/>
+                <a:hlinkClick r:id="rId13"/>
               </a:rPr>
               <a:t>here</a:t>
             </a:r>
@@ -8027,7 +8037,7 @@
           </a:ln>
           <a:extLst>
             <a:ext uri="{C572A759-6A51-4108-AA02-DFA0A04FC94B}">
-              <ma14:wrappingTextBoxFlag xmlns:ma14="http://schemas.microsoft.com/office/mac/drawingml/2011/main" xmlns:a14="http://schemas.microsoft.com/office/drawing/2010/main" xmlns:m="http://schemas.openxmlformats.org/officeDocument/2006/math" xmlns="" val="1"/>
+              <ma14:wrappingTextBoxFlag xmlns="" xmlns:m="http://schemas.openxmlformats.org/officeDocument/2006/math" xmlns:a14="http://schemas.microsoft.com/office/drawing/2010/main" xmlns:ma14="http://schemas.microsoft.com/office/mac/drawingml/2011/main" val="1"/>
             </a:ext>
           </a:extLst>
         </p:spPr>
@@ -8094,7 +8104,7 @@
           </a:ln>
           <a:extLst>
             <a:ext uri="{C572A759-6A51-4108-AA02-DFA0A04FC94B}">
-              <ma14:wrappingTextBoxFlag xmlns:ma14="http://schemas.microsoft.com/office/mac/drawingml/2011/main" xmlns:a14="http://schemas.microsoft.com/office/drawing/2010/main" xmlns:m="http://schemas.openxmlformats.org/officeDocument/2006/math" xmlns="" val="1"/>
+              <ma14:wrappingTextBoxFlag xmlns="" xmlns:m="http://schemas.openxmlformats.org/officeDocument/2006/math" xmlns:a14="http://schemas.microsoft.com/office/drawing/2010/main" xmlns:ma14="http://schemas.microsoft.com/office/mac/drawingml/2011/main" val="1"/>
             </a:ext>
           </a:extLst>
         </p:spPr>
@@ -8180,7 +8190,7 @@
           </a:ln>
           <a:extLst>
             <a:ext uri="{C572A759-6A51-4108-AA02-DFA0A04FC94B}">
-              <ma14:wrappingTextBoxFlag xmlns:ma14="http://schemas.microsoft.com/office/mac/drawingml/2011/main" xmlns:a14="http://schemas.microsoft.com/office/drawing/2010/main" xmlns:m="http://schemas.openxmlformats.org/officeDocument/2006/math" xmlns="" val="1"/>
+              <ma14:wrappingTextBoxFlag xmlns="" xmlns:m="http://schemas.openxmlformats.org/officeDocument/2006/math" xmlns:a14="http://schemas.microsoft.com/office/drawing/2010/main" xmlns:ma14="http://schemas.microsoft.com/office/mac/drawingml/2011/main" val="1"/>
             </a:ext>
           </a:extLst>
         </p:spPr>
@@ -8305,7 +8315,7 @@
           </a:ln>
           <a:extLst>
             <a:ext uri="{C572A759-6A51-4108-AA02-DFA0A04FC94B}">
-              <ma14:wrappingTextBoxFlag xmlns:ma14="http://schemas.microsoft.com/office/mac/drawingml/2011/main" xmlns:a14="http://schemas.microsoft.com/office/drawing/2010/main" xmlns:m="http://schemas.openxmlformats.org/officeDocument/2006/math" xmlns="" val="1"/>
+              <ma14:wrappingTextBoxFlag xmlns="" xmlns:m="http://schemas.openxmlformats.org/officeDocument/2006/math" xmlns:a14="http://schemas.microsoft.com/office/drawing/2010/main" xmlns:ma14="http://schemas.microsoft.com/office/mac/drawingml/2011/main" val="1"/>
             </a:ext>
           </a:extLst>
         </p:spPr>
@@ -8406,7 +8416,7 @@
           </a:ln>
           <a:extLst>
             <a:ext uri="{C572A759-6A51-4108-AA02-DFA0A04FC94B}">
-              <ma14:wrappingTextBoxFlag xmlns:ma14="http://schemas.microsoft.com/office/mac/drawingml/2011/main" xmlns:a14="http://schemas.microsoft.com/office/drawing/2010/main" xmlns:m="http://schemas.openxmlformats.org/officeDocument/2006/math" xmlns="" val="1"/>
+              <ma14:wrappingTextBoxFlag xmlns="" xmlns:m="http://schemas.openxmlformats.org/officeDocument/2006/math" xmlns:a14="http://schemas.microsoft.com/office/drawing/2010/main" xmlns:ma14="http://schemas.microsoft.com/office/mac/drawingml/2011/main" val="1"/>
             </a:ext>
           </a:extLst>
         </p:spPr>
@@ -8579,7 +8589,7 @@
           </a:ln>
           <a:extLst>
             <a:ext uri="{C572A759-6A51-4108-AA02-DFA0A04FC94B}">
-              <ma14:wrappingTextBoxFlag xmlns:ma14="http://schemas.microsoft.com/office/mac/drawingml/2011/main" xmlns:a14="http://schemas.microsoft.com/office/drawing/2010/main" xmlns:m="http://schemas.openxmlformats.org/officeDocument/2006/math" xmlns="" val="1"/>
+              <ma14:wrappingTextBoxFlag xmlns="" xmlns:m="http://schemas.openxmlformats.org/officeDocument/2006/math" xmlns:a14="http://schemas.microsoft.com/office/drawing/2010/main" xmlns:ma14="http://schemas.microsoft.com/office/mac/drawingml/2011/main" val="1"/>
             </a:ext>
           </a:extLst>
         </p:spPr>
@@ -8634,7 +8644,7 @@
                 <a:ea typeface="Source Sans Pro"/>
                 <a:cs typeface="Source Sans Pro"/>
                 <a:sym typeface="Source Sans Pro"/>
-                <a:hlinkClick r:id="rId13"/>
+                <a:hlinkClick r:id="rId14"/>
               </a:rPr>
               <a:t>Inline comments</a:t>
             </a:r>
@@ -8691,7 +8701,7 @@
                 <a:ea typeface="Source Sans Pro"/>
                 <a:cs typeface="Source Sans Pro"/>
                 <a:sym typeface="Source Sans Pro"/>
-                <a:hlinkClick r:id="rId14"/>
+                <a:hlinkClick r:id="rId15"/>
               </a:rPr>
               <a:t>Block comments</a:t>
             </a:r>
@@ -8745,7 +8755,7 @@
                 <a:ea typeface="Source Sans Pro"/>
                 <a:cs typeface="Source Sans Pro"/>
                 <a:sym typeface="Source Sans Pro"/>
-                <a:hlinkClick r:id="rId15"/>
+                <a:hlinkClick r:id="rId16"/>
               </a:rPr>
               <a:t>Docstrings</a:t>
             </a:r>
@@ -8786,7 +8796,7 @@
           </a:ln>
           <a:extLst>
             <a:ext uri="{C572A759-6A51-4108-AA02-DFA0A04FC94B}">
-              <ma14:wrappingTextBoxFlag xmlns:ma14="http://schemas.microsoft.com/office/mac/drawingml/2011/main" xmlns:a14="http://schemas.microsoft.com/office/drawing/2010/main" xmlns:m="http://schemas.openxmlformats.org/officeDocument/2006/math" xmlns="" val="1"/>
+              <ma14:wrappingTextBoxFlag xmlns="" xmlns:m="http://schemas.openxmlformats.org/officeDocument/2006/math" xmlns:a14="http://schemas.microsoft.com/office/drawing/2010/main" xmlns:ma14="http://schemas.microsoft.com/office/mac/drawingml/2011/main" val="1"/>
             </a:ext>
           </a:extLst>
         </p:spPr>
@@ -8888,7 +8898,7 @@
           </a:ln>
           <a:extLst>
             <a:ext uri="{C572A759-6A51-4108-AA02-DFA0A04FC94B}">
-              <ma14:wrappingTextBoxFlag xmlns:ma14="http://schemas.microsoft.com/office/mac/drawingml/2011/main" xmlns:a14="http://schemas.microsoft.com/office/drawing/2010/main" xmlns:m="http://schemas.openxmlformats.org/officeDocument/2006/math" xmlns="" val="1"/>
+              <ma14:wrappingTextBoxFlag xmlns="" xmlns:m="http://schemas.openxmlformats.org/officeDocument/2006/math" xmlns:a14="http://schemas.microsoft.com/office/drawing/2010/main" xmlns:ma14="http://schemas.microsoft.com/office/mac/drawingml/2011/main" val="1"/>
             </a:ext>
           </a:extLst>
         </p:spPr>
@@ -8964,7 +8974,7 @@
           </a:ln>
           <a:extLst>
             <a:ext uri="{C572A759-6A51-4108-AA02-DFA0A04FC94B}">
-              <ma14:wrappingTextBoxFlag xmlns:ma14="http://schemas.microsoft.com/office/mac/drawingml/2011/main" xmlns:a14="http://schemas.microsoft.com/office/drawing/2010/main" xmlns:m="http://schemas.openxmlformats.org/officeDocument/2006/math" xmlns="" val="1"/>
+              <ma14:wrappingTextBoxFlag xmlns="" xmlns:m="http://schemas.openxmlformats.org/officeDocument/2006/math" xmlns:a14="http://schemas.microsoft.com/office/drawing/2010/main" xmlns:ma14="http://schemas.microsoft.com/office/mac/drawingml/2011/main" val="1"/>
             </a:ext>
           </a:extLst>
         </p:spPr>
@@ -9043,7 +9053,7 @@
           </a:ln>
           <a:extLst>
             <a:ext uri="{C572A759-6A51-4108-AA02-DFA0A04FC94B}">
-              <ma14:wrappingTextBoxFlag xmlns:ma14="http://schemas.microsoft.com/office/mac/drawingml/2011/main" xmlns:a14="http://schemas.microsoft.com/office/drawing/2010/main" xmlns:m="http://schemas.openxmlformats.org/officeDocument/2006/math" xmlns="" val="1"/>
+              <ma14:wrappingTextBoxFlag xmlns="" xmlns:m="http://schemas.openxmlformats.org/officeDocument/2006/math" xmlns:a14="http://schemas.microsoft.com/office/drawing/2010/main" xmlns:ma14="http://schemas.microsoft.com/office/mac/drawingml/2011/main" val="1"/>
             </a:ext>
           </a:extLst>
         </p:spPr>
@@ -9123,7 +9133,7 @@
           </a:ln>
           <a:extLst>
             <a:ext uri="{C572A759-6A51-4108-AA02-DFA0A04FC94B}">
-              <ma14:wrappingTextBoxFlag xmlns:ma14="http://schemas.microsoft.com/office/mac/drawingml/2011/main" xmlns:a14="http://schemas.microsoft.com/office/drawing/2010/main" xmlns:m="http://schemas.openxmlformats.org/officeDocument/2006/math" xmlns="" val="1"/>
+              <ma14:wrappingTextBoxFlag xmlns="" xmlns:m="http://schemas.openxmlformats.org/officeDocument/2006/math" xmlns:a14="http://schemas.microsoft.com/office/drawing/2010/main" xmlns:ma14="http://schemas.microsoft.com/office/mac/drawingml/2011/main" val="1"/>
             </a:ext>
           </a:extLst>
         </p:spPr>
@@ -9209,7 +9219,7 @@
           </a:ln>
           <a:extLst>
             <a:ext uri="{C572A759-6A51-4108-AA02-DFA0A04FC94B}">
-              <ma14:wrappingTextBoxFlag xmlns:ma14="http://schemas.microsoft.com/office/mac/drawingml/2011/main" xmlns:a14="http://schemas.microsoft.com/office/drawing/2010/main" xmlns:m="http://schemas.openxmlformats.org/officeDocument/2006/math" xmlns="" val="1"/>
+              <ma14:wrappingTextBoxFlag xmlns="" xmlns:m="http://schemas.openxmlformats.org/officeDocument/2006/math" xmlns:a14="http://schemas.microsoft.com/office/drawing/2010/main" xmlns:ma14="http://schemas.microsoft.com/office/mac/drawingml/2011/main" val="1"/>
             </a:ext>
           </a:extLst>
         </p:spPr>
@@ -9289,7 +9299,7 @@
           </a:ln>
           <a:extLst>
             <a:ext uri="{C572A759-6A51-4108-AA02-DFA0A04FC94B}">
-              <ma14:wrappingTextBoxFlag xmlns:ma14="http://schemas.microsoft.com/office/mac/drawingml/2011/main" xmlns:a14="http://schemas.microsoft.com/office/drawing/2010/main" xmlns:m="http://schemas.openxmlformats.org/officeDocument/2006/math" xmlns="" val="1"/>
+              <ma14:wrappingTextBoxFlag xmlns="" xmlns:m="http://schemas.openxmlformats.org/officeDocument/2006/math" xmlns:a14="http://schemas.microsoft.com/office/drawing/2010/main" xmlns:ma14="http://schemas.microsoft.com/office/mac/drawingml/2011/main" val="1"/>
             </a:ext>
           </a:extLst>
         </p:spPr>
@@ -9392,7 +9402,7 @@
           </a:ln>
           <a:extLst>
             <a:ext uri="{C572A759-6A51-4108-AA02-DFA0A04FC94B}">
-              <ma14:wrappingTextBoxFlag xmlns:ma14="http://schemas.microsoft.com/office/mac/drawingml/2011/main" xmlns:a14="http://schemas.microsoft.com/office/drawing/2010/main" xmlns:m="http://schemas.openxmlformats.org/officeDocument/2006/math" xmlns="" val="1"/>
+              <ma14:wrappingTextBoxFlag xmlns="" xmlns:m="http://schemas.openxmlformats.org/officeDocument/2006/math" xmlns:a14="http://schemas.microsoft.com/office/drawing/2010/main" xmlns:ma14="http://schemas.microsoft.com/office/mac/drawingml/2011/main" val="1"/>
             </a:ext>
           </a:extLst>
         </p:spPr>
@@ -9447,7 +9457,7 @@
                 <a:ea typeface="Source Sans Pro"/>
                 <a:cs typeface="Source Sans Pro"/>
                 <a:sym typeface="Source Sans Pro"/>
-                <a:hlinkClick r:id="rId16"/>
+                <a:hlinkClick r:id="rId17"/>
               </a:rPr>
               <a:t>these instructions</a:t>
             </a:r>
@@ -9497,7 +9507,7 @@
           </a:ln>
           <a:extLst>
             <a:ext uri="{C572A759-6A51-4108-AA02-DFA0A04FC94B}">
-              <ma14:wrappingTextBoxFlag xmlns:ma14="http://schemas.microsoft.com/office/mac/drawingml/2011/main" xmlns:a14="http://schemas.microsoft.com/office/drawing/2010/main" xmlns:m="http://schemas.openxmlformats.org/officeDocument/2006/math" xmlns="" val="1"/>
+              <ma14:wrappingTextBoxFlag xmlns="" xmlns:m="http://schemas.openxmlformats.org/officeDocument/2006/math" xmlns:a14="http://schemas.microsoft.com/office/drawing/2010/main" xmlns:ma14="http://schemas.microsoft.com/office/mac/drawingml/2011/main" val="1"/>
             </a:ext>
           </a:extLst>
         </p:spPr>
@@ -9537,7 +9547,7 @@
                 <a:solidFill>
                   <a:srgbClr val="010000"/>
                 </a:solidFill>
-                <a:hlinkClick r:id="rId17"/>
+                <a:hlinkClick r:id="rId18"/>
               </a:rPr>
               <a:t>semantic versioning scheme</a:t>
             </a:r>
@@ -9570,7 +9580,7 @@
                 <a:solidFill>
                   <a:srgbClr val="010000"/>
                 </a:solidFill>
-                <a:hlinkClick r:id="rId18"/>
+                <a:hlinkClick r:id="rId19"/>
               </a:rPr>
               <a:t>Releasing and Versioning chapter</a:t>
             </a:r>
@@ -9643,7 +9653,7 @@
           </a:ln>
           <a:extLst>
             <a:ext uri="{C572A759-6A51-4108-AA02-DFA0A04FC94B}">
-              <ma14:wrappingTextBoxFlag xmlns:ma14="http://schemas.microsoft.com/office/mac/drawingml/2011/main" xmlns:a14="http://schemas.microsoft.com/office/drawing/2010/main" xmlns:m="http://schemas.openxmlformats.org/officeDocument/2006/math" xmlns="" val="1"/>
+              <ma14:wrappingTextBoxFlag xmlns="" xmlns:m="http://schemas.openxmlformats.org/officeDocument/2006/math" xmlns:a14="http://schemas.microsoft.com/office/drawing/2010/main" xmlns:ma14="http://schemas.microsoft.com/office/mac/drawingml/2011/main" val="1"/>
             </a:ext>
           </a:extLst>
         </p:spPr>
@@ -9701,7 +9711,7 @@
           </a:ln>
           <a:extLst>
             <a:ext uri="{C572A759-6A51-4108-AA02-DFA0A04FC94B}">
-              <ma14:wrappingTextBoxFlag xmlns:ma14="http://schemas.microsoft.com/office/mac/drawingml/2011/main" xmlns:a14="http://schemas.microsoft.com/office/drawing/2010/main" xmlns:m="http://schemas.openxmlformats.org/officeDocument/2006/math" xmlns="" val="1"/>
+              <ma14:wrappingTextBoxFlag xmlns="" xmlns:m="http://schemas.openxmlformats.org/officeDocument/2006/math" xmlns:a14="http://schemas.microsoft.com/office/drawing/2010/main" xmlns:ma14="http://schemas.microsoft.com/office/mac/drawingml/2011/main" val="1"/>
             </a:ext>
           </a:extLst>
         </p:spPr>
@@ -9796,7 +9806,7 @@
           </a:ln>
           <a:extLst>
             <a:ext uri="{C572A759-6A51-4108-AA02-DFA0A04FC94B}">
-              <ma14:wrappingTextBoxFlag xmlns:ma14="http://schemas.microsoft.com/office/mac/drawingml/2011/main" xmlns:a14="http://schemas.microsoft.com/office/drawing/2010/main" xmlns:m="http://schemas.openxmlformats.org/officeDocument/2006/math" xmlns="" val="1"/>
+              <ma14:wrappingTextBoxFlag xmlns="" xmlns:m="http://schemas.openxmlformats.org/officeDocument/2006/math" xmlns:a14="http://schemas.microsoft.com/office/drawing/2010/main" xmlns:ma14="http://schemas.microsoft.com/office/mac/drawingml/2011/main" val="1"/>
             </a:ext>
           </a:extLst>
         </p:spPr>
@@ -9863,7 +9873,7 @@
           </a:ln>
           <a:extLst>
             <a:ext uri="{C572A759-6A51-4108-AA02-DFA0A04FC94B}">
-              <ma14:wrappingTextBoxFlag xmlns:ma14="http://schemas.microsoft.com/office/mac/drawingml/2011/main" xmlns:a14="http://schemas.microsoft.com/office/drawing/2010/main" xmlns:m="http://schemas.openxmlformats.org/officeDocument/2006/math" xmlns="" val="1"/>
+              <ma14:wrappingTextBoxFlag xmlns="" xmlns:m="http://schemas.openxmlformats.org/officeDocument/2006/math" xmlns:a14="http://schemas.microsoft.com/office/drawing/2010/main" xmlns:ma14="http://schemas.microsoft.com/office/mac/drawingml/2011/main" val="1"/>
             </a:ext>
           </a:extLst>
         </p:spPr>
@@ -9949,7 +9959,7 @@
           </a:ln>
           <a:extLst>
             <a:ext uri="{C572A759-6A51-4108-AA02-DFA0A04FC94B}">
-              <ma14:wrappingTextBoxFlag xmlns:ma14="http://schemas.microsoft.com/office/mac/drawingml/2011/main" xmlns:a14="http://schemas.microsoft.com/office/drawing/2010/main" xmlns:m="http://schemas.openxmlformats.org/officeDocument/2006/math" xmlns="" val="1"/>
+              <ma14:wrappingTextBoxFlag xmlns="" xmlns:m="http://schemas.openxmlformats.org/officeDocument/2006/math" xmlns:a14="http://schemas.microsoft.com/office/drawing/2010/main" xmlns:ma14="http://schemas.microsoft.com/office/mac/drawingml/2011/main" val="1"/>
             </a:ext>
           </a:extLst>
         </p:spPr>
@@ -10112,7 +10122,7 @@
             </a:ln>
             <a:extLst>
               <a:ext uri="{C572A759-6A51-4108-AA02-DFA0A04FC94B}">
-                <ma14:wrappingTextBoxFlag xmlns:ma14="http://schemas.microsoft.com/office/mac/drawingml/2011/main" xmlns:a14="http://schemas.microsoft.com/office/drawing/2010/main" xmlns:m="http://schemas.openxmlformats.org/officeDocument/2006/math" xmlns="" val="1"/>
+                <ma14:wrappingTextBoxFlag xmlns="" xmlns:m="http://schemas.openxmlformats.org/officeDocument/2006/math" xmlns:a14="http://schemas.microsoft.com/office/drawing/2010/main" xmlns:ma14="http://schemas.microsoft.com/office/mac/drawingml/2011/main" val="1"/>
               </a:ext>
             </a:extLst>
           </p:spPr>
@@ -10200,7 +10210,7 @@
           </a:ln>
           <a:extLst>
             <a:ext uri="{C572A759-6A51-4108-AA02-DFA0A04FC94B}">
-              <ma14:wrappingTextBoxFlag xmlns:ma14="http://schemas.microsoft.com/office/mac/drawingml/2011/main" xmlns:a14="http://schemas.microsoft.com/office/drawing/2010/main" xmlns:m="http://schemas.openxmlformats.org/officeDocument/2006/math" xmlns="" val="1"/>
+              <ma14:wrappingTextBoxFlag xmlns="" xmlns:m="http://schemas.openxmlformats.org/officeDocument/2006/math" xmlns:a14="http://schemas.microsoft.com/office/drawing/2010/main" xmlns:ma14="http://schemas.microsoft.com/office/mac/drawingml/2011/main" val="1"/>
             </a:ext>
           </a:extLst>
         </p:spPr>
@@ -10286,7 +10296,7 @@
           </a:ln>
           <a:extLst>
             <a:ext uri="{C572A759-6A51-4108-AA02-DFA0A04FC94B}">
-              <ma14:wrappingTextBoxFlag xmlns:ma14="http://schemas.microsoft.com/office/mac/drawingml/2011/main" xmlns:a14="http://schemas.microsoft.com/office/drawing/2010/main" xmlns:m="http://schemas.openxmlformats.org/officeDocument/2006/math" xmlns="" val="1"/>
+              <ma14:wrappingTextBoxFlag xmlns="" xmlns:m="http://schemas.openxmlformats.org/officeDocument/2006/math" xmlns:a14="http://schemas.microsoft.com/office/drawing/2010/main" xmlns:ma14="http://schemas.microsoft.com/office/mac/drawingml/2011/main" val="1"/>
             </a:ext>
           </a:extLst>
         </p:spPr>
@@ -10442,7 +10452,7 @@
           </a:ln>
           <a:extLst>
             <a:ext uri="{C572A759-6A51-4108-AA02-DFA0A04FC94B}">
-              <ma14:wrappingTextBoxFlag xmlns:ma14="http://schemas.microsoft.com/office/mac/drawingml/2011/main" xmlns:a14="http://schemas.microsoft.com/office/drawing/2010/main" xmlns:m="http://schemas.openxmlformats.org/officeDocument/2006/math" xmlns="" val="1"/>
+              <ma14:wrappingTextBoxFlag xmlns="" xmlns:m="http://schemas.openxmlformats.org/officeDocument/2006/math" xmlns:a14="http://schemas.microsoft.com/office/drawing/2010/main" xmlns:ma14="http://schemas.microsoft.com/office/mac/drawingml/2011/main" val="1"/>
             </a:ext>
           </a:extLst>
         </p:spPr>
@@ -10497,7 +10507,7 @@
                 <a:ea typeface="Source Sans Pro"/>
                 <a:cs typeface="Source Sans Pro"/>
                 <a:sym typeface="Source Sans Pro"/>
-                <a:hlinkClick r:id="rId19"/>
+                <a:hlinkClick r:id="rId20"/>
               </a:rPr>
               <a:t>TestPyPI</a:t>
             </a:r>
@@ -10553,7 +10563,7 @@
           </a:ln>
           <a:extLst>
             <a:ext uri="{C572A759-6A51-4108-AA02-DFA0A04FC94B}">
-              <ma14:wrappingTextBoxFlag xmlns:ma14="http://schemas.microsoft.com/office/mac/drawingml/2011/main" xmlns:a14="http://schemas.microsoft.com/office/drawing/2010/main" xmlns:m="http://schemas.openxmlformats.org/officeDocument/2006/math" xmlns="" val="1"/>
+              <ma14:wrappingTextBoxFlag xmlns="" xmlns:m="http://schemas.openxmlformats.org/officeDocument/2006/math" xmlns:a14="http://schemas.microsoft.com/office/drawing/2010/main" xmlns:ma14="http://schemas.microsoft.com/office/mac/drawingml/2011/main" val="1"/>
             </a:ext>
           </a:extLst>
         </p:spPr>
@@ -10611,7 +10621,7 @@
           </a:ln>
           <a:extLst>
             <a:ext uri="{C572A759-6A51-4108-AA02-DFA0A04FC94B}">
-              <ma14:wrappingTextBoxFlag xmlns:ma14="http://schemas.microsoft.com/office/mac/drawingml/2011/main" xmlns:a14="http://schemas.microsoft.com/office/drawing/2010/main" xmlns:m="http://schemas.openxmlformats.org/officeDocument/2006/math" xmlns="" val="1"/>
+              <ma14:wrappingTextBoxFlag xmlns="" xmlns:m="http://schemas.openxmlformats.org/officeDocument/2006/math" xmlns:a14="http://schemas.microsoft.com/office/drawing/2010/main" xmlns:ma14="http://schemas.microsoft.com/office/mac/drawingml/2011/main" val="1"/>
             </a:ext>
           </a:extLst>
         </p:spPr>
@@ -10666,7 +10676,7 @@
                 <a:ea typeface="Source Sans Pro"/>
                 <a:cs typeface="Source Sans Pro"/>
                 <a:sym typeface="Source Sans Pro"/>
-                <a:hlinkClick r:id="rId20"/>
+                <a:hlinkClick r:id="rId21"/>
               </a:rPr>
               <a:t>PyPI</a:t>
             </a:r>
@@ -10716,7 +10726,7 @@
           </a:ln>
           <a:extLst>
             <a:ext uri="{C572A759-6A51-4108-AA02-DFA0A04FC94B}">
-              <ma14:wrappingTextBoxFlag xmlns:ma14="http://schemas.microsoft.com/office/mac/drawingml/2011/main" xmlns:a14="http://schemas.microsoft.com/office/drawing/2010/main" xmlns:m="http://schemas.openxmlformats.org/officeDocument/2006/math" xmlns="" val="1"/>
+              <ma14:wrappingTextBoxFlag xmlns="" xmlns:m="http://schemas.openxmlformats.org/officeDocument/2006/math" xmlns:a14="http://schemas.microsoft.com/office/drawing/2010/main" xmlns:ma14="http://schemas.microsoft.com/office/mac/drawingml/2011/main" val="1"/>
             </a:ext>
           </a:extLst>
         </p:spPr>
@@ -10772,7 +10782,7 @@
                 <a:solidFill>
                   <a:srgbClr val="010000"/>
                 </a:solidFill>
-                <a:hlinkClick r:id="rId21"/>
+                <a:hlinkClick r:id="rId22"/>
               </a:rPr>
               <a:t>GitHub Actions</a:t>
             </a:r>
@@ -10840,7 +10850,7 @@
                 <a:solidFill>
                   <a:srgbClr val="010000"/>
                 </a:solidFill>
-                <a:hlinkClick r:id="rId11"/>
+                <a:hlinkClick r:id="rId12"/>
               </a:rPr>
               <a:t>UBC-MDS </a:t>
             </a:r>
@@ -10849,7 +10859,7 @@
                 <a:solidFill>
                   <a:srgbClr val="010000"/>
                 </a:solidFill>
-                <a:hlinkClick r:id="rId11"/>
+                <a:hlinkClick r:id="rId12"/>
               </a:rPr>
               <a:t>cookiecutter</a:t>
             </a:r>
@@ -10882,7 +10892,7 @@
                 <a:solidFill>
                   <a:srgbClr val="010000"/>
                 </a:solidFill>
-                <a:hlinkClick r:id="rId22"/>
+                <a:hlinkClick r:id="rId23"/>
               </a:rPr>
               <a:t>CI/CD chapter</a:t>
             </a:r>
@@ -10949,7 +10959,7 @@
           </a:ln>
           <a:extLst>
             <a:ext uri="{C572A759-6A51-4108-AA02-DFA0A04FC94B}">
-              <ma14:wrappingTextBoxFlag xmlns:ma14="http://schemas.microsoft.com/office/mac/drawingml/2011/main" xmlns:a14="http://schemas.microsoft.com/office/drawing/2010/main" xmlns:m="http://schemas.openxmlformats.org/officeDocument/2006/math" xmlns="" val="1"/>
+              <ma14:wrappingTextBoxFlag xmlns="" xmlns:m="http://schemas.openxmlformats.org/officeDocument/2006/math" xmlns:a14="http://schemas.microsoft.com/office/drawing/2010/main" xmlns:ma14="http://schemas.microsoft.com/office/mac/drawingml/2011/main" val="1"/>
             </a:ext>
           </a:extLst>
         </p:spPr>
@@ -10989,7 +10999,7 @@
                 <a:solidFill>
                   <a:srgbClr val="010000"/>
                 </a:solidFill>
-                <a:hlinkClick r:id="rId23"/>
+                <a:hlinkClick r:id="rId24"/>
               </a:rPr>
               <a:t>Rstudio Cheatsheets</a:t>
             </a:r>
@@ -11006,7 +11016,7 @@
                 <a:solidFill>
                   <a:srgbClr val="010000"/>
                 </a:solidFill>
-                <a:hlinkClick r:id="rId24"/>
+                <a:hlinkClick r:id="rId25"/>
               </a:rPr>
               <a:t>Cookiecutter</a:t>
             </a:r>
@@ -11023,7 +11033,7 @@
                 <a:solidFill>
                   <a:srgbClr val="010000"/>
                 </a:solidFill>
-                <a:hlinkClick r:id="rId25"/>
+                <a:hlinkClick r:id="rId26"/>
               </a:rPr>
               <a:t>Jupyter Book</a:t>
             </a:r>
@@ -11195,7 +11205,7 @@
             </a:ln>
             <a:extLst>
               <a:ext uri="{C572A759-6A51-4108-AA02-DFA0A04FC94B}">
-                <ma14:wrappingTextBoxFlag xmlns:ma14="http://schemas.microsoft.com/office/mac/drawingml/2011/main" xmlns:a14="http://schemas.microsoft.com/office/drawing/2010/main" xmlns:m="http://schemas.openxmlformats.org/officeDocument/2006/math" xmlns="" val="1"/>
+                <ma14:wrappingTextBoxFlag xmlns="" xmlns:m="http://schemas.openxmlformats.org/officeDocument/2006/math" xmlns:a14="http://schemas.microsoft.com/office/drawing/2010/main" xmlns:ma14="http://schemas.microsoft.com/office/mac/drawingml/2011/main" val="1"/>
               </a:ext>
             </a:extLst>
           </p:spPr>
@@ -11388,7 +11398,7 @@
             </a:ln>
             <a:extLst>
               <a:ext uri="{C572A759-6A51-4108-AA02-DFA0A04FC94B}">
-                <ma14:wrappingTextBoxFlag xmlns:ma14="http://schemas.microsoft.com/office/mac/drawingml/2011/main" xmlns:a14="http://schemas.microsoft.com/office/drawing/2010/main" xmlns:m="http://schemas.openxmlformats.org/officeDocument/2006/math" xmlns="" val="1"/>
+                <ma14:wrappingTextBoxFlag xmlns="" xmlns:m="http://schemas.openxmlformats.org/officeDocument/2006/math" xmlns:a14="http://schemas.microsoft.com/office/drawing/2010/main" xmlns:ma14="http://schemas.microsoft.com/office/mac/drawingml/2011/main" val="1"/>
               </a:ext>
             </a:extLst>
           </p:spPr>
@@ -11581,7 +11591,7 @@
             </a:ln>
             <a:extLst>
               <a:ext uri="{C572A759-6A51-4108-AA02-DFA0A04FC94B}">
-                <ma14:wrappingTextBoxFlag xmlns:ma14="http://schemas.microsoft.com/office/mac/drawingml/2011/main" xmlns:a14="http://schemas.microsoft.com/office/drawing/2010/main" xmlns:m="http://schemas.openxmlformats.org/officeDocument/2006/math" xmlns="" val="1"/>
+                <ma14:wrappingTextBoxFlag xmlns="" xmlns:m="http://schemas.openxmlformats.org/officeDocument/2006/math" xmlns:a14="http://schemas.microsoft.com/office/drawing/2010/main" xmlns:ma14="http://schemas.microsoft.com/office/mac/drawingml/2011/main" val="1"/>
               </a:ext>
             </a:extLst>
           </p:spPr>
@@ -11774,7 +11784,7 @@
             </a:ln>
             <a:extLst>
               <a:ext uri="{C572A759-6A51-4108-AA02-DFA0A04FC94B}">
-                <ma14:wrappingTextBoxFlag xmlns:ma14="http://schemas.microsoft.com/office/mac/drawingml/2011/main" xmlns:a14="http://schemas.microsoft.com/office/drawing/2010/main" xmlns:m="http://schemas.openxmlformats.org/officeDocument/2006/math" xmlns="" val="1"/>
+                <ma14:wrappingTextBoxFlag xmlns="" xmlns:m="http://schemas.openxmlformats.org/officeDocument/2006/math" xmlns:a14="http://schemas.microsoft.com/office/drawing/2010/main" xmlns:ma14="http://schemas.microsoft.com/office/mac/drawingml/2011/main" val="1"/>
               </a:ext>
             </a:extLst>
           </p:spPr>
@@ -11967,7 +11977,7 @@
             </a:ln>
             <a:extLst>
               <a:ext uri="{C572A759-6A51-4108-AA02-DFA0A04FC94B}">
-                <ma14:wrappingTextBoxFlag xmlns:ma14="http://schemas.microsoft.com/office/mac/drawingml/2011/main" xmlns:a14="http://schemas.microsoft.com/office/drawing/2010/main" xmlns:m="http://schemas.openxmlformats.org/officeDocument/2006/math" xmlns="" val="1"/>
+                <ma14:wrappingTextBoxFlag xmlns="" xmlns:m="http://schemas.openxmlformats.org/officeDocument/2006/math" xmlns:a14="http://schemas.microsoft.com/office/drawing/2010/main" xmlns:ma14="http://schemas.microsoft.com/office/mac/drawingml/2011/main" val="1"/>
               </a:ext>
             </a:extLst>
           </p:spPr>
@@ -12160,7 +12170,7 @@
             </a:ln>
             <a:extLst>
               <a:ext uri="{C572A759-6A51-4108-AA02-DFA0A04FC94B}">
-                <ma14:wrappingTextBoxFlag xmlns:ma14="http://schemas.microsoft.com/office/mac/drawingml/2011/main" xmlns:a14="http://schemas.microsoft.com/office/drawing/2010/main" xmlns:m="http://schemas.openxmlformats.org/officeDocument/2006/math" xmlns="" val="1"/>
+                <ma14:wrappingTextBoxFlag xmlns="" xmlns:m="http://schemas.openxmlformats.org/officeDocument/2006/math" xmlns:a14="http://schemas.microsoft.com/office/drawing/2010/main" xmlns:ma14="http://schemas.microsoft.com/office/mac/drawingml/2011/main" val="1"/>
               </a:ext>
             </a:extLst>
           </p:spPr>

</xml_diff>